<commit_message>
Telnet worker, File cache
</commit_message>
<xml_diff>
--- a/docs/Chat Server.pptx
+++ b/docs/Chat Server.pptx
@@ -252,7 +252,7 @@
           <a:p>
             <a:fld id="{F4E9F0C9-77EA-47D3-82C5-ED286EEB23A0}" type="datetimeFigureOut">
               <a:rPr lang="en-US" smtClean="0"/>
-              <a:t>28-Oct-15</a:t>
+              <a:t>29-Oct-15</a:t>
             </a:fld>
             <a:endParaRPr lang="en-US"/>
           </a:p>
@@ -5191,7 +5191,7 @@
           <a:p>
             <a:fld id="{9B4966DF-B686-4572-83C3-A5E4D5C04EEB}" type="datetimeFigureOut">
               <a:rPr lang="en-US" smtClean="0"/>
-              <a:t>28-Oct-15</a:t>
+              <a:t>29-Oct-15</a:t>
             </a:fld>
             <a:endParaRPr lang="en-US"/>
           </a:p>
@@ -5369,7 +5369,7 @@
           <a:p>
             <a:fld id="{9B4966DF-B686-4572-83C3-A5E4D5C04EEB}" type="datetimeFigureOut">
               <a:rPr lang="en-US" smtClean="0"/>
-              <a:t>28-Oct-15</a:t>
+              <a:t>29-Oct-15</a:t>
             </a:fld>
             <a:endParaRPr lang="en-US"/>
           </a:p>
@@ -5557,7 +5557,7 @@
           <a:p>
             <a:fld id="{9B4966DF-B686-4572-83C3-A5E4D5C04EEB}" type="datetimeFigureOut">
               <a:rPr lang="en-US" smtClean="0"/>
-              <a:t>28-Oct-15</a:t>
+              <a:t>29-Oct-15</a:t>
             </a:fld>
             <a:endParaRPr lang="en-US"/>
           </a:p>
@@ -5735,7 +5735,7 @@
           <a:p>
             <a:fld id="{9B4966DF-B686-4572-83C3-A5E4D5C04EEB}" type="datetimeFigureOut">
               <a:rPr lang="en-US" smtClean="0"/>
-              <a:t>28-Oct-15</a:t>
+              <a:t>29-Oct-15</a:t>
             </a:fld>
             <a:endParaRPr lang="en-US"/>
           </a:p>
@@ -5987,7 +5987,7 @@
           <a:p>
             <a:fld id="{9B4966DF-B686-4572-83C3-A5E4D5C04EEB}" type="datetimeFigureOut">
               <a:rPr lang="en-US" smtClean="0"/>
-              <a:t>28-Oct-15</a:t>
+              <a:t>29-Oct-15</a:t>
             </a:fld>
             <a:endParaRPr lang="en-US"/>
           </a:p>
@@ -6227,7 +6227,7 @@
           <a:p>
             <a:fld id="{9B4966DF-B686-4572-83C3-A5E4D5C04EEB}" type="datetimeFigureOut">
               <a:rPr lang="en-US" smtClean="0"/>
-              <a:t>28-Oct-15</a:t>
+              <a:t>29-Oct-15</a:t>
             </a:fld>
             <a:endParaRPr lang="en-US"/>
           </a:p>
@@ -6602,7 +6602,7 @@
           <a:p>
             <a:fld id="{9B4966DF-B686-4572-83C3-A5E4D5C04EEB}" type="datetimeFigureOut">
               <a:rPr lang="en-US" smtClean="0"/>
-              <a:t>28-Oct-15</a:t>
+              <a:t>29-Oct-15</a:t>
             </a:fld>
             <a:endParaRPr lang="en-US"/>
           </a:p>
@@ -6728,7 +6728,7 @@
           <a:p>
             <a:fld id="{9B4966DF-B686-4572-83C3-A5E4D5C04EEB}" type="datetimeFigureOut">
               <a:rPr lang="en-US" smtClean="0"/>
-              <a:t>28-Oct-15</a:t>
+              <a:t>29-Oct-15</a:t>
             </a:fld>
             <a:endParaRPr lang="en-US"/>
           </a:p>
@@ -6831,7 +6831,7 @@
           <a:p>
             <a:fld id="{9B4966DF-B686-4572-83C3-A5E4D5C04EEB}" type="datetimeFigureOut">
               <a:rPr lang="en-US" smtClean="0"/>
-              <a:t>28-Oct-15</a:t>
+              <a:t>29-Oct-15</a:t>
             </a:fld>
             <a:endParaRPr lang="en-US"/>
           </a:p>
@@ -7116,7 +7116,7 @@
           <a:p>
             <a:fld id="{9B4966DF-B686-4572-83C3-A5E4D5C04EEB}" type="datetimeFigureOut">
               <a:rPr lang="en-US" smtClean="0"/>
-              <a:t>28-Oct-15</a:t>
+              <a:t>29-Oct-15</a:t>
             </a:fld>
             <a:endParaRPr lang="en-US"/>
           </a:p>
@@ -7381,7 +7381,7 @@
           <a:p>
             <a:fld id="{9B4966DF-B686-4572-83C3-A5E4D5C04EEB}" type="datetimeFigureOut">
               <a:rPr lang="en-US" smtClean="0"/>
-              <a:t>28-Oct-15</a:t>
+              <a:t>29-Oct-15</a:t>
             </a:fld>
             <a:endParaRPr lang="en-US"/>
           </a:p>
@@ -7602,7 +7602,7 @@
           <a:p>
             <a:fld id="{9B4966DF-B686-4572-83C3-A5E4D5C04EEB}" type="datetimeFigureOut">
               <a:rPr lang="en-US" smtClean="0"/>
-              <a:t>28-Oct-15</a:t>
+              <a:t>29-Oct-15</a:t>
             </a:fld>
             <a:endParaRPr lang="en-US"/>
           </a:p>
@@ -10540,11 +10540,7 @@
             <a:pPr lvl="3"/>
             <a:r>
               <a:rPr lang="en-US" dirty="0" smtClean="0"/>
-              <a:t>name</a:t>
-            </a:r>
-            <a:r>
-              <a:rPr lang="en-US" dirty="0" smtClean="0"/>
-              <a:t>=“</a:t>
+              <a:t>name=“</a:t>
             </a:r>
             <a:r>
               <a:rPr lang="en-US" dirty="0" err="1" smtClean="0"/>
@@ -10554,7 +10550,6 @@
               <a:rPr lang="en-US" dirty="0" smtClean="0"/>
               <a:t>”</a:t>
             </a:r>
-            <a:endParaRPr lang="en-US" dirty="0" smtClean="0"/>
           </a:p>
           <a:p>
             <a:pPr lvl="2"/>
@@ -10579,17 +10574,8 @@
             </a:r>
             <a:r>
               <a:rPr lang="en-US" dirty="0" smtClean="0"/>
-              <a:t>=“</a:t>
-            </a:r>
-            <a:r>
-              <a:rPr lang="en-US" dirty="0" smtClean="0"/>
-              <a:t>last retrieved </a:t>
-            </a:r>
-            <a:r>
-              <a:rPr lang="en-US" dirty="0" smtClean="0"/>
-              <a:t>hash”</a:t>
-            </a:r>
-            <a:endParaRPr lang="en-US" dirty="0" smtClean="0"/>
+              <a:t>=“last retrieved hash”</a:t>
+            </a:r>
           </a:p>
           <a:p>
             <a:pPr lvl="1"/>
@@ -10618,25 +10604,12 @@
               <a:rPr lang="en-US" dirty="0" smtClean="0"/>
               <a:t>users =</a:t>
             </a:r>
-            <a:endParaRPr lang="en-US" dirty="0" smtClean="0"/>
           </a:p>
           <a:p>
             <a:pPr lvl="3"/>
             <a:r>
               <a:rPr lang="en-US" dirty="0" smtClean="0"/>
-              <a:t>&lt;user username</a:t>
-            </a:r>
-            <a:r>
-              <a:rPr lang="en-US" dirty="0" smtClean="0"/>
-              <a:t>=“user</a:t>
-            </a:r>
-            <a:r>
-              <a:rPr lang="en-US" dirty="0" smtClean="0"/>
-              <a:t>” </a:t>
-            </a:r>
-            <a:r>
-              <a:rPr lang="en-US" dirty="0" smtClean="0"/>
-              <a:t>/&gt;</a:t>
+              <a:t>&lt;user username=“user” /&gt;</a:t>
             </a:r>
           </a:p>
           <a:p>
@@ -10647,16 +10620,11 @@
             </a:r>
             <a:r>
               <a:rPr lang="en-US" dirty="0" smtClean="0"/>
-              <a:t> </a:t>
-            </a:r>
-            <a:r>
-              <a:rPr lang="en-US" dirty="0" smtClean="0"/>
-              <a:t>= last </a:t>
-            </a:r>
-            <a:r>
-              <a:rPr lang="en-US" dirty="0" smtClean="0"/>
-              <a:t>hash</a:t>
-            </a:r>
+              <a:t> = last hash</a:t>
+            </a:r>
+            <a:br>
+              <a:rPr lang="en-US" dirty="0" smtClean="0"/>
+            </a:br>
             <a:r>
               <a:rPr lang="en-US" dirty="0" smtClean="0"/>
               <a:t/>
@@ -10666,18 +10634,7 @@
             </a:br>
             <a:r>
               <a:rPr lang="en-US" dirty="0" smtClean="0"/>
-              <a:t/>
-            </a:r>
-            <a:br>
-              <a:rPr lang="en-US" dirty="0" smtClean="0"/>
-            </a:br>
-            <a:r>
-              <a:rPr lang="en-US" dirty="0" smtClean="0"/>
               <a:t>or</a:t>
-            </a:r>
-            <a:r>
-              <a:rPr lang="en-US" dirty="0" smtClean="0"/>
-              <a:t/>
             </a:r>
             <a:br>
               <a:rPr lang="en-US" dirty="0" smtClean="0"/>
@@ -10726,11 +10683,11 @@
   <p:clrMapOvr>
     <a:masterClrMapping/>
   </p:clrMapOvr>
-  <mc:AlternateContent xmlns:mc="http://schemas.openxmlformats.org/markup-compatibility/2006">
-    <mc:Choice xmlns:p14="http://schemas.microsoft.com/office/powerpoint/2010/main" Requires="p14">
+  <mc:AlternateContent xmlns:mc="http://schemas.openxmlformats.org/markup-compatibility/2006" xmlns:p14="http://schemas.microsoft.com/office/powerpoint/2010/main">
+    <mc:Choice Requires="p14">
       <p:transition p14:dur="0"/>
     </mc:Choice>
-    <mc:Fallback>
+    <mc:Fallback xmlns="">
       <p:transition/>
     </mc:Fallback>
   </mc:AlternateContent>
@@ -22683,236 +22640,20 @@
           <a:chExt cx="0" cy="0"/>
         </a:xfrm>
       </p:grpSpPr>
-      <p:sp>
-        <p:nvSpPr>
-          <p:cNvPr id="48" name="Cloud 47"/>
-          <p:cNvSpPr/>
-          <p:nvPr/>
-        </p:nvSpPr>
-        <p:spPr>
-          <a:xfrm>
-            <a:off x="3400425" y="5523190"/>
-            <a:ext cx="5486401" cy="1006196"/>
-          </a:xfrm>
-          <a:prstGeom prst="cloud">
-            <a:avLst/>
-          </a:prstGeom>
-        </p:spPr>
-        <p:style>
-          <a:lnRef idx="2">
-            <a:schemeClr val="dk1"/>
-          </a:lnRef>
-          <a:fillRef idx="1">
-            <a:schemeClr val="lt1"/>
-          </a:fillRef>
-          <a:effectRef idx="0">
-            <a:schemeClr val="dk1"/>
-          </a:effectRef>
-          <a:fontRef idx="minor">
-            <a:schemeClr val="dk1"/>
-          </a:fontRef>
-        </p:style>
-        <p:txBody>
-          <a:bodyPr rtlCol="0" anchor="ctr"/>
-          <a:lstStyle/>
-          <a:p>
-            <a:pPr algn="ctr"/>
-            <a:r>
-              <a:rPr lang="en-GB" b="1" dirty="0" smtClean="0"/>
-              <a:t>Network</a:t>
-            </a:r>
-            <a:endParaRPr lang="en-US" b="1" dirty="0"/>
-          </a:p>
-        </p:txBody>
-      </p:sp>
       <p:cxnSp>
         <p:nvCxnSpPr>
-          <p:cNvPr id="18" name="Straight Arrow Connector 17"/>
-          <p:cNvCxnSpPr/>
+          <p:cNvPr id="59" name="Straight Arrow Connector 58"/>
+          <p:cNvCxnSpPr>
+            <a:endCxn id="6" idx="1"/>
+          </p:cNvCxnSpPr>
           <p:nvPr/>
         </p:nvCxnSpPr>
         <p:spPr>
-          <a:xfrm>
-            <a:off x="4191490" y="4862504"/>
-            <a:ext cx="0" cy="895357"/>
+          <a:xfrm rot="5400000" flipH="1" flipV="1">
+            <a:off x="3362327" y="2492162"/>
+            <a:ext cx="3135158" cy="1933202"/>
           </a:xfrm>
-          <a:prstGeom prst="straightConnector1">
-            <a:avLst/>
-          </a:prstGeom>
-          <a:ln w="28575">
-            <a:headEnd type="triangle"/>
-            <a:tailEnd type="triangle"/>
-          </a:ln>
-        </p:spPr>
-        <p:style>
-          <a:lnRef idx="1">
-            <a:schemeClr val="accent1"/>
-          </a:lnRef>
-          <a:fillRef idx="0">
-            <a:schemeClr val="accent1"/>
-          </a:fillRef>
-          <a:effectRef idx="0">
-            <a:schemeClr val="accent1"/>
-          </a:effectRef>
-          <a:fontRef idx="minor">
-            <a:schemeClr val="tx1"/>
-          </a:fontRef>
-        </p:style>
-      </p:cxnSp>
-      <p:cxnSp>
-        <p:nvCxnSpPr>
-          <p:cNvPr id="19" name="Straight Arrow Connector 18"/>
-          <p:cNvCxnSpPr/>
-          <p:nvPr/>
-        </p:nvCxnSpPr>
-        <p:spPr>
-          <a:xfrm>
-            <a:off x="4829444" y="4862504"/>
-            <a:ext cx="0" cy="895357"/>
-          </a:xfrm>
-          <a:prstGeom prst="straightConnector1">
-            <a:avLst/>
-          </a:prstGeom>
-          <a:ln w="28575">
-            <a:solidFill>
-              <a:srgbClr val="FF0000"/>
-            </a:solidFill>
-            <a:headEnd type="triangle"/>
-            <a:tailEnd type="triangle"/>
-          </a:ln>
-        </p:spPr>
-        <p:style>
-          <a:lnRef idx="1">
-            <a:schemeClr val="accent1"/>
-          </a:lnRef>
-          <a:fillRef idx="0">
-            <a:schemeClr val="accent1"/>
-          </a:fillRef>
-          <a:effectRef idx="0">
-            <a:schemeClr val="accent1"/>
-          </a:effectRef>
-          <a:fontRef idx="minor">
-            <a:schemeClr val="tx1"/>
-          </a:fontRef>
-        </p:style>
-      </p:cxnSp>
-      <p:cxnSp>
-        <p:nvCxnSpPr>
-          <p:cNvPr id="27" name="Straight Arrow Connector 26"/>
-          <p:cNvCxnSpPr/>
-          <p:nvPr/>
-        </p:nvCxnSpPr>
-        <p:spPr>
-          <a:xfrm>
-            <a:off x="5811893" y="4862504"/>
-            <a:ext cx="0" cy="895357"/>
-          </a:xfrm>
-          <a:prstGeom prst="straightConnector1">
-            <a:avLst/>
-          </a:prstGeom>
-          <a:ln w="28575">
-            <a:headEnd type="triangle"/>
-            <a:tailEnd type="triangle"/>
-          </a:ln>
-        </p:spPr>
-        <p:style>
-          <a:lnRef idx="1">
-            <a:schemeClr val="accent1"/>
-          </a:lnRef>
-          <a:fillRef idx="0">
-            <a:schemeClr val="accent1"/>
-          </a:fillRef>
-          <a:effectRef idx="0">
-            <a:schemeClr val="accent1"/>
-          </a:effectRef>
-          <a:fontRef idx="minor">
-            <a:schemeClr val="tx1"/>
-          </a:fontRef>
-        </p:style>
-      </p:cxnSp>
-      <p:cxnSp>
-        <p:nvCxnSpPr>
-          <p:cNvPr id="28" name="Straight Arrow Connector 27"/>
-          <p:cNvCxnSpPr/>
-          <p:nvPr/>
-        </p:nvCxnSpPr>
-        <p:spPr>
-          <a:xfrm>
-            <a:off x="6449846" y="4862504"/>
-            <a:ext cx="0" cy="895357"/>
-          </a:xfrm>
-          <a:prstGeom prst="straightConnector1">
-            <a:avLst/>
-          </a:prstGeom>
-          <a:ln w="28575">
-            <a:solidFill>
-              <a:srgbClr val="FF0000"/>
-            </a:solidFill>
-            <a:headEnd type="triangle"/>
-            <a:tailEnd type="triangle"/>
-          </a:ln>
-        </p:spPr>
-        <p:style>
-          <a:lnRef idx="1">
-            <a:schemeClr val="accent1"/>
-          </a:lnRef>
-          <a:fillRef idx="0">
-            <a:schemeClr val="accent1"/>
-          </a:fillRef>
-          <a:effectRef idx="0">
-            <a:schemeClr val="accent1"/>
-          </a:effectRef>
-          <a:fontRef idx="minor">
-            <a:schemeClr val="tx1"/>
-          </a:fontRef>
-        </p:style>
-      </p:cxnSp>
-      <p:cxnSp>
-        <p:nvCxnSpPr>
-          <p:cNvPr id="37" name="Straight Arrow Connector 36"/>
-          <p:cNvCxnSpPr/>
-          <p:nvPr/>
-        </p:nvCxnSpPr>
-        <p:spPr>
-          <a:xfrm>
-            <a:off x="7432294" y="4862504"/>
-            <a:ext cx="0" cy="895357"/>
-          </a:xfrm>
-          <a:prstGeom prst="straightConnector1">
-            <a:avLst/>
-          </a:prstGeom>
-          <a:ln w="28575">
-            <a:headEnd type="triangle"/>
-            <a:tailEnd type="triangle"/>
-          </a:ln>
-        </p:spPr>
-        <p:style>
-          <a:lnRef idx="1">
-            <a:schemeClr val="accent1"/>
-          </a:lnRef>
-          <a:fillRef idx="0">
-            <a:schemeClr val="accent1"/>
-          </a:fillRef>
-          <a:effectRef idx="0">
-            <a:schemeClr val="accent1"/>
-          </a:effectRef>
-          <a:fontRef idx="minor">
-            <a:schemeClr val="tx1"/>
-          </a:fontRef>
-        </p:style>
-      </p:cxnSp>
-      <p:cxnSp>
-        <p:nvCxnSpPr>
-          <p:cNvPr id="38" name="Straight Arrow Connector 37"/>
-          <p:cNvCxnSpPr/>
-          <p:nvPr/>
-        </p:nvCxnSpPr>
-        <p:spPr>
-          <a:xfrm>
-            <a:off x="8070248" y="4862504"/>
-            <a:ext cx="0" cy="895357"/>
-          </a:xfrm>
-          <a:prstGeom prst="straightConnector1">
+          <a:prstGeom prst="bentConnector2">
             <a:avLst/>
           </a:prstGeom>
           <a:ln w="28575">
@@ -22940,6 +22681,48 @@
       </p:cxnSp>
       <p:sp>
         <p:nvSpPr>
+          <p:cNvPr id="48" name="Cloud 47"/>
+          <p:cNvSpPr/>
+          <p:nvPr/>
+        </p:nvSpPr>
+        <p:spPr>
+          <a:xfrm>
+            <a:off x="3731941" y="5972226"/>
+            <a:ext cx="4090188" cy="687245"/>
+          </a:xfrm>
+          <a:prstGeom prst="cloud">
+            <a:avLst/>
+          </a:prstGeom>
+        </p:spPr>
+        <p:style>
+          <a:lnRef idx="2">
+            <a:schemeClr val="dk1"/>
+          </a:lnRef>
+          <a:fillRef idx="1">
+            <a:schemeClr val="lt1"/>
+          </a:fillRef>
+          <a:effectRef idx="0">
+            <a:schemeClr val="dk1"/>
+          </a:effectRef>
+          <a:fontRef idx="minor">
+            <a:schemeClr val="dk1"/>
+          </a:fontRef>
+        </p:style>
+        <p:txBody>
+          <a:bodyPr rtlCol="0" anchor="ctr"/>
+          <a:lstStyle/>
+          <a:p>
+            <a:pPr algn="ctr"/>
+            <a:r>
+              <a:rPr lang="en-GB" b="1" dirty="0" smtClean="0"/>
+              <a:t>Network</a:t>
+            </a:r>
+            <a:endParaRPr lang="en-US" b="1" dirty="0"/>
+          </a:p>
+        </p:txBody>
+      </p:sp>
+      <p:sp>
+        <p:nvSpPr>
           <p:cNvPr id="4" name="Title 3"/>
           <p:cNvSpPr>
             <a:spLocks noGrp="1"/>
@@ -23019,7 +22802,7 @@
           <a:p>
             <a:r>
               <a:rPr lang="en-GB" sz="1800" dirty="0" smtClean="0"/>
-              <a:t>Child </a:t>
+              <a:t>HTTP Child </a:t>
             </a:r>
             <a:r>
               <a:rPr lang="en-GB" sz="1800" dirty="0" err="1" smtClean="0"/>
@@ -23027,7 +22810,15 @@
             </a:r>
             <a:r>
               <a:rPr lang="en-GB" sz="1800" dirty="0" smtClean="0"/>
-              <a:t> c2s </a:t>
+              <a:t> </a:t>
+            </a:r>
+            <a:r>
+              <a:rPr lang="en-GB" sz="1800" dirty="0" smtClean="0"/>
+              <a:t>c2s HTTP, incoming </a:t>
+            </a:r>
+            <a:r>
+              <a:rPr lang="en-GB" sz="1800" dirty="0" smtClean="0"/>
+              <a:t>s2s </a:t>
             </a:r>
             <a:r>
               <a:rPr lang="en-GB" sz="1800" dirty="0" err="1" smtClean="0"/>
@@ -23035,16 +22826,27 @@
             </a:r>
             <a:r>
               <a:rPr lang="en-GB" sz="1800" dirty="0" smtClean="0"/>
-              <a:t> incoming s2s </a:t>
+              <a:t> crypto</a:t>
+            </a:r>
+            <a:r>
+              <a:rPr lang="en-GB" sz="1800" dirty="0" smtClean="0"/>
+              <a:t>.</a:t>
+            </a:r>
+          </a:p>
+          <a:p>
+            <a:r>
+              <a:rPr lang="en-GB" sz="1800" dirty="0" smtClean="0"/>
+              <a:t>Telnet Child </a:t>
             </a:r>
             <a:r>
               <a:rPr lang="en-GB" sz="1800" dirty="0" err="1" smtClean="0"/>
-              <a:t>dan</a:t>
+              <a:t>menangani</a:t>
             </a:r>
             <a:r>
               <a:rPr lang="en-GB" sz="1800" dirty="0" smtClean="0"/>
-              <a:t> crypto.</a:t>
-            </a:r>
+              <a:t> c2s Telnet.</a:t>
+            </a:r>
+            <a:endParaRPr lang="en-GB" sz="1800" dirty="0" smtClean="0"/>
           </a:p>
           <a:p>
             <a:r>
@@ -23163,26 +22965,13 @@
             </a:r>
             <a:r>
               <a:rPr lang="en-GB" sz="1800" dirty="0" smtClean="0"/>
-              <a:t> master.</a:t>
-            </a:r>
-          </a:p>
-          <a:p>
-            <a:r>
-              <a:rPr lang="en-GB" sz="1800" dirty="0" err="1" smtClean="0"/>
-              <a:t>Jumlah</a:t>
+              <a:t> master</a:t>
             </a:r>
             <a:r>
               <a:rPr lang="en-GB" sz="1800" dirty="0" smtClean="0"/>
-              <a:t> child = </a:t>
-            </a:r>
-            <a:r>
-              <a:rPr lang="en-GB" sz="1800" dirty="0" err="1" smtClean="0"/>
-              <a:t>jumlah</a:t>
-            </a:r>
-            <a:r>
-              <a:rPr lang="en-GB" sz="1800" dirty="0" smtClean="0"/>
-              <a:t> logical processor - 1.</a:t>
-            </a:r>
+              <a:t>.</a:t>
+            </a:r>
+            <a:endParaRPr lang="en-GB" sz="1800" dirty="0" smtClean="0"/>
           </a:p>
         </p:txBody>
       </p:sp>
@@ -23194,7 +22983,7 @@
         </p:nvSpPr>
         <p:spPr>
           <a:xfrm>
-            <a:off x="5512054" y="1690689"/>
+            <a:off x="5896507" y="1507809"/>
             <a:ext cx="1263148" cy="766750"/>
           </a:xfrm>
           <a:prstGeom prst="rect">
@@ -23230,56 +23019,14 @@
       </p:sp>
       <p:sp>
         <p:nvSpPr>
-          <p:cNvPr id="7" name="Rectangle 6"/>
-          <p:cNvSpPr/>
-          <p:nvPr/>
-        </p:nvSpPr>
-        <p:spPr>
-          <a:xfrm>
-            <a:off x="3891651" y="3795705"/>
-            <a:ext cx="1263148" cy="1066799"/>
-          </a:xfrm>
-          <a:prstGeom prst="rect">
-            <a:avLst/>
-          </a:prstGeom>
-        </p:spPr>
-        <p:style>
-          <a:lnRef idx="2">
-            <a:schemeClr val="dk1"/>
-          </a:lnRef>
-          <a:fillRef idx="1">
-            <a:schemeClr val="lt1"/>
-          </a:fillRef>
-          <a:effectRef idx="0">
-            <a:schemeClr val="dk1"/>
-          </a:effectRef>
-          <a:fontRef idx="minor">
-            <a:schemeClr val="dk1"/>
-          </a:fontRef>
-        </p:style>
-        <p:txBody>
-          <a:bodyPr rtlCol="0" anchor="ctr"/>
-          <a:lstStyle/>
-          <a:p>
-            <a:pPr algn="ctr"/>
-            <a:r>
-              <a:rPr lang="en-GB" dirty="0" smtClean="0"/>
-              <a:t>Child 1</a:t>
-            </a:r>
-            <a:endParaRPr lang="en-US" dirty="0"/>
-          </a:p>
-        </p:txBody>
-      </p:sp>
-      <p:sp>
-        <p:nvSpPr>
           <p:cNvPr id="11" name="Rectangle 10"/>
           <p:cNvSpPr/>
           <p:nvPr/>
         </p:nvSpPr>
         <p:spPr>
           <a:xfrm>
-            <a:off x="3891651" y="2776535"/>
-            <a:ext cx="4503953" cy="723896"/>
+            <a:off x="4276104" y="2485546"/>
+            <a:ext cx="4503953" cy="543874"/>
           </a:xfrm>
           <a:prstGeom prst="rect">
             <a:avLst/>
@@ -23322,11 +23069,14 @@
         </p:nvSpPr>
         <p:spPr>
           <a:xfrm>
-            <a:off x="5926722" y="2307435"/>
-            <a:ext cx="433808" cy="600075"/>
+            <a:off x="6420919" y="2161954"/>
+            <a:ext cx="263104" cy="422643"/>
           </a:xfrm>
           <a:prstGeom prst="upDownArrow">
-            <a:avLst/>
+            <a:avLst>
+              <a:gd name="adj1" fmla="val 35948"/>
+              <a:gd name="adj2" fmla="val 39461"/>
+            </a:avLst>
           </a:prstGeom>
         </p:spPr>
         <p:style>
@@ -23356,337 +23106,13 @@
       </p:sp>
       <p:sp>
         <p:nvSpPr>
-          <p:cNvPr id="20" name="TextBox 19"/>
-          <p:cNvSpPr txBox="1"/>
-          <p:nvPr/>
-        </p:nvSpPr>
-        <p:spPr>
-          <a:xfrm>
-            <a:off x="3965642" y="5101766"/>
-            <a:ext cx="436899" cy="369332"/>
-          </a:xfrm>
-          <a:prstGeom prst="rect">
-            <a:avLst/>
-          </a:prstGeom>
-          <a:solidFill>
-            <a:schemeClr val="bg1"/>
-          </a:solidFill>
-        </p:spPr>
-        <p:txBody>
-          <a:bodyPr wrap="none" rtlCol="0">
-            <a:spAutoFit/>
-          </a:bodyPr>
-          <a:lstStyle/>
-          <a:p>
-            <a:r>
-              <a:rPr lang="en-GB" b="1" dirty="0" smtClean="0">
-                <a:solidFill>
-                  <a:schemeClr val="accent1"/>
-                </a:solidFill>
-              </a:rPr>
-              <a:t>c2s</a:t>
-            </a:r>
-            <a:endParaRPr lang="en-US" b="1" dirty="0">
-              <a:solidFill>
-                <a:schemeClr val="accent1"/>
-              </a:solidFill>
-            </a:endParaRPr>
-          </a:p>
-        </p:txBody>
-      </p:sp>
-      <p:sp>
-        <p:nvSpPr>
-          <p:cNvPr id="21" name="TextBox 20"/>
-          <p:cNvSpPr txBox="1"/>
-          <p:nvPr/>
-        </p:nvSpPr>
-        <p:spPr>
-          <a:xfrm>
-            <a:off x="4613063" y="5101766"/>
-            <a:ext cx="436899" cy="369332"/>
-          </a:xfrm>
-          <a:prstGeom prst="rect">
-            <a:avLst/>
-          </a:prstGeom>
-          <a:solidFill>
-            <a:schemeClr val="bg1"/>
-          </a:solidFill>
-        </p:spPr>
-        <p:txBody>
-          <a:bodyPr wrap="none" rtlCol="0">
-            <a:spAutoFit/>
-          </a:bodyPr>
-          <a:lstStyle/>
-          <a:p>
-            <a:r>
-              <a:rPr lang="en-GB" b="1" dirty="0" smtClean="0">
-                <a:solidFill>
-                  <a:srgbClr val="FF0000"/>
-                </a:solidFill>
-              </a:rPr>
-              <a:t>s2s</a:t>
-            </a:r>
-            <a:endParaRPr lang="en-US" b="1" dirty="0">
-              <a:solidFill>
-                <a:srgbClr val="FF0000"/>
-              </a:solidFill>
-            </a:endParaRPr>
-          </a:p>
-        </p:txBody>
-      </p:sp>
-      <p:sp>
-        <p:nvSpPr>
-          <p:cNvPr id="26" name="Rectangle 25"/>
-          <p:cNvSpPr/>
-          <p:nvPr/>
-        </p:nvSpPr>
-        <p:spPr>
-          <a:xfrm>
-            <a:off x="5512054" y="3795705"/>
-            <a:ext cx="1263148" cy="1066799"/>
-          </a:xfrm>
-          <a:prstGeom prst="rect">
-            <a:avLst/>
-          </a:prstGeom>
-        </p:spPr>
-        <p:style>
-          <a:lnRef idx="2">
-            <a:schemeClr val="dk1"/>
-          </a:lnRef>
-          <a:fillRef idx="1">
-            <a:schemeClr val="lt1"/>
-          </a:fillRef>
-          <a:effectRef idx="0">
-            <a:schemeClr val="dk1"/>
-          </a:effectRef>
-          <a:fontRef idx="minor">
-            <a:schemeClr val="dk1"/>
-          </a:fontRef>
-        </p:style>
-        <p:txBody>
-          <a:bodyPr rtlCol="0" anchor="ctr"/>
-          <a:lstStyle/>
-          <a:p>
-            <a:pPr algn="ctr"/>
-            <a:r>
-              <a:rPr lang="en-GB" dirty="0" smtClean="0"/>
-              <a:t>Child 2</a:t>
-            </a:r>
-            <a:endParaRPr lang="en-US" dirty="0"/>
-          </a:p>
-        </p:txBody>
-      </p:sp>
-      <p:sp>
-        <p:nvSpPr>
-          <p:cNvPr id="29" name="TextBox 28"/>
-          <p:cNvSpPr txBox="1"/>
-          <p:nvPr/>
-        </p:nvSpPr>
-        <p:spPr>
-          <a:xfrm>
-            <a:off x="5586045" y="5101766"/>
-            <a:ext cx="436899" cy="369332"/>
-          </a:xfrm>
-          <a:prstGeom prst="rect">
-            <a:avLst/>
-          </a:prstGeom>
-          <a:solidFill>
-            <a:schemeClr val="bg1"/>
-          </a:solidFill>
-        </p:spPr>
-        <p:txBody>
-          <a:bodyPr wrap="none" rtlCol="0">
-            <a:spAutoFit/>
-          </a:bodyPr>
-          <a:lstStyle/>
-          <a:p>
-            <a:r>
-              <a:rPr lang="en-GB" b="1" dirty="0" smtClean="0">
-                <a:solidFill>
-                  <a:schemeClr val="accent1"/>
-                </a:solidFill>
-              </a:rPr>
-              <a:t>c2s</a:t>
-            </a:r>
-            <a:endParaRPr lang="en-US" b="1" dirty="0">
-              <a:solidFill>
-                <a:schemeClr val="accent1"/>
-              </a:solidFill>
-            </a:endParaRPr>
-          </a:p>
-        </p:txBody>
-      </p:sp>
-      <p:sp>
-        <p:nvSpPr>
-          <p:cNvPr id="30" name="TextBox 29"/>
-          <p:cNvSpPr txBox="1"/>
-          <p:nvPr/>
-        </p:nvSpPr>
-        <p:spPr>
-          <a:xfrm>
-            <a:off x="6233467" y="5101766"/>
-            <a:ext cx="436899" cy="369332"/>
-          </a:xfrm>
-          <a:prstGeom prst="rect">
-            <a:avLst/>
-          </a:prstGeom>
-          <a:solidFill>
-            <a:schemeClr val="bg1"/>
-          </a:solidFill>
-        </p:spPr>
-        <p:txBody>
-          <a:bodyPr wrap="none" rtlCol="0">
-            <a:spAutoFit/>
-          </a:bodyPr>
-          <a:lstStyle/>
-          <a:p>
-            <a:r>
-              <a:rPr lang="en-GB" b="1" dirty="0" smtClean="0">
-                <a:solidFill>
-                  <a:srgbClr val="FF0000"/>
-                </a:solidFill>
-              </a:rPr>
-              <a:t>s2s</a:t>
-            </a:r>
-            <a:endParaRPr lang="en-US" b="1" dirty="0">
-              <a:solidFill>
-                <a:srgbClr val="FF0000"/>
-              </a:solidFill>
-            </a:endParaRPr>
-          </a:p>
-        </p:txBody>
-      </p:sp>
-      <p:sp>
-        <p:nvSpPr>
-          <p:cNvPr id="36" name="Rectangle 35"/>
-          <p:cNvSpPr/>
-          <p:nvPr/>
-        </p:nvSpPr>
-        <p:spPr>
-          <a:xfrm>
-            <a:off x="7132456" y="3795705"/>
-            <a:ext cx="1263148" cy="1066799"/>
-          </a:xfrm>
-          <a:prstGeom prst="rect">
-            <a:avLst/>
-          </a:prstGeom>
-        </p:spPr>
-        <p:style>
-          <a:lnRef idx="2">
-            <a:schemeClr val="dk1"/>
-          </a:lnRef>
-          <a:fillRef idx="1">
-            <a:schemeClr val="lt1"/>
-          </a:fillRef>
-          <a:effectRef idx="0">
-            <a:schemeClr val="dk1"/>
-          </a:effectRef>
-          <a:fontRef idx="minor">
-            <a:schemeClr val="dk1"/>
-          </a:fontRef>
-        </p:style>
-        <p:txBody>
-          <a:bodyPr rtlCol="0" anchor="ctr"/>
-          <a:lstStyle/>
-          <a:p>
-            <a:pPr algn="ctr"/>
-            <a:r>
-              <a:rPr lang="en-GB" dirty="0" smtClean="0"/>
-              <a:t>Child 3</a:t>
-            </a:r>
-            <a:endParaRPr lang="en-US" dirty="0"/>
-          </a:p>
-        </p:txBody>
-      </p:sp>
-      <p:sp>
-        <p:nvSpPr>
-          <p:cNvPr id="39" name="TextBox 38"/>
-          <p:cNvSpPr txBox="1"/>
-          <p:nvPr/>
-        </p:nvSpPr>
-        <p:spPr>
-          <a:xfrm>
-            <a:off x="7206446" y="5101766"/>
-            <a:ext cx="436899" cy="369332"/>
-          </a:xfrm>
-          <a:prstGeom prst="rect">
-            <a:avLst/>
-          </a:prstGeom>
-          <a:solidFill>
-            <a:schemeClr val="bg1"/>
-          </a:solidFill>
-        </p:spPr>
-        <p:txBody>
-          <a:bodyPr wrap="none" rtlCol="0">
-            <a:spAutoFit/>
-          </a:bodyPr>
-          <a:lstStyle/>
-          <a:p>
-            <a:r>
-              <a:rPr lang="en-GB" b="1" dirty="0" smtClean="0">
-                <a:solidFill>
-                  <a:schemeClr val="accent1"/>
-                </a:solidFill>
-              </a:rPr>
-              <a:t>c2s</a:t>
-            </a:r>
-            <a:endParaRPr lang="en-US" b="1" dirty="0">
-              <a:solidFill>
-                <a:schemeClr val="accent1"/>
-              </a:solidFill>
-            </a:endParaRPr>
-          </a:p>
-        </p:txBody>
-      </p:sp>
-      <p:sp>
-        <p:nvSpPr>
-          <p:cNvPr id="40" name="TextBox 39"/>
-          <p:cNvSpPr txBox="1"/>
-          <p:nvPr/>
-        </p:nvSpPr>
-        <p:spPr>
-          <a:xfrm>
-            <a:off x="7853868" y="5101766"/>
-            <a:ext cx="436899" cy="369332"/>
-          </a:xfrm>
-          <a:prstGeom prst="rect">
-            <a:avLst/>
-          </a:prstGeom>
-          <a:solidFill>
-            <a:schemeClr val="bg1"/>
-          </a:solidFill>
-        </p:spPr>
-        <p:txBody>
-          <a:bodyPr wrap="none" rtlCol="0">
-            <a:spAutoFit/>
-          </a:bodyPr>
-          <a:lstStyle/>
-          <a:p>
-            <a:r>
-              <a:rPr lang="en-GB" b="1" dirty="0" smtClean="0">
-                <a:solidFill>
-                  <a:srgbClr val="FF0000"/>
-                </a:solidFill>
-              </a:rPr>
-              <a:t>s2s</a:t>
-            </a:r>
-            <a:endParaRPr lang="en-US" b="1" dirty="0">
-              <a:solidFill>
-                <a:srgbClr val="FF0000"/>
-              </a:solidFill>
-            </a:endParaRPr>
-          </a:p>
-        </p:txBody>
-      </p:sp>
-      <p:sp>
-        <p:nvSpPr>
           <p:cNvPr id="55" name="Can 54"/>
           <p:cNvSpPr/>
           <p:nvPr/>
         </p:nvSpPr>
         <p:spPr>
           <a:xfrm>
-            <a:off x="7360574" y="1690689"/>
+            <a:off x="7745027" y="1492569"/>
             <a:ext cx="861038" cy="766750"/>
           </a:xfrm>
           <a:prstGeom prst="can">
@@ -23730,7 +23156,7 @@
         </p:nvSpPr>
         <p:spPr>
           <a:xfrm rot="16200000">
-            <a:off x="6878699" y="1663200"/>
+            <a:off x="7263152" y="1465080"/>
             <a:ext cx="357187" cy="821727"/>
           </a:xfrm>
           <a:prstGeom prst="upDownArrow">
@@ -23764,14 +23190,949 @@
       </p:sp>
       <p:sp>
         <p:nvSpPr>
-          <p:cNvPr id="2" name="Rectangle 1"/>
+          <p:cNvPr id="60" name="TextBox 59"/>
+          <p:cNvSpPr txBox="1"/>
+          <p:nvPr/>
+        </p:nvSpPr>
+        <p:spPr>
+          <a:xfrm>
+            <a:off x="4519554" y="1690669"/>
+            <a:ext cx="503574" cy="369332"/>
+          </a:xfrm>
+          <a:prstGeom prst="rect">
+            <a:avLst/>
+          </a:prstGeom>
+          <a:solidFill>
+            <a:schemeClr val="bg1"/>
+          </a:solidFill>
+        </p:spPr>
+        <p:txBody>
+          <a:bodyPr wrap="square" rtlCol="0">
+            <a:spAutoFit/>
+          </a:bodyPr>
+          <a:lstStyle/>
+          <a:p>
+            <a:pPr algn="ctr"/>
+            <a:r>
+              <a:rPr lang="en-GB" b="1" dirty="0" smtClean="0">
+                <a:solidFill>
+                  <a:srgbClr val="FF0000"/>
+                </a:solidFill>
+              </a:rPr>
+              <a:t>s2s</a:t>
+            </a:r>
+            <a:endParaRPr lang="en-US" b="1" dirty="0">
+              <a:solidFill>
+                <a:srgbClr val="FF0000"/>
+              </a:solidFill>
+            </a:endParaRPr>
+          </a:p>
+        </p:txBody>
+      </p:sp>
+      <p:grpSp>
+        <p:nvGrpSpPr>
+          <p:cNvPr id="72" name="Group 71"/>
+          <p:cNvGrpSpPr/>
+          <p:nvPr/>
+        </p:nvGrpSpPr>
+        <p:grpSpPr>
+          <a:xfrm>
+            <a:off x="4334700" y="3114602"/>
+            <a:ext cx="4037185" cy="1902967"/>
+            <a:chOff x="4014660" y="3312722"/>
+            <a:chExt cx="4037185" cy="1902967"/>
+          </a:xfrm>
+        </p:grpSpPr>
+        <p:grpSp>
+          <p:nvGrpSpPr>
+            <p:cNvPr id="32" name="Group 31"/>
+            <p:cNvGrpSpPr/>
+            <p:nvPr/>
+          </p:nvGrpSpPr>
+          <p:grpSpPr>
+            <a:xfrm>
+              <a:off x="4545463" y="4511985"/>
+              <a:ext cx="2605517" cy="703704"/>
+              <a:chOff x="4545463" y="4710104"/>
+              <a:chExt cx="2605517" cy="895357"/>
+            </a:xfrm>
+          </p:grpSpPr>
+          <p:cxnSp>
+            <p:nvCxnSpPr>
+              <p:cNvPr id="19" name="Straight Arrow Connector 18"/>
+              <p:cNvCxnSpPr/>
+              <p:nvPr/>
+            </p:nvCxnSpPr>
+            <p:spPr>
+              <a:xfrm>
+                <a:off x="5686337" y="4710104"/>
+                <a:ext cx="0" cy="895357"/>
+              </a:xfrm>
+              <a:prstGeom prst="straightConnector1">
+                <a:avLst/>
+              </a:prstGeom>
+              <a:ln w="28575">
+                <a:solidFill>
+                  <a:srgbClr val="FF0000"/>
+                </a:solidFill>
+                <a:headEnd type="triangle"/>
+                <a:tailEnd type="triangle"/>
+              </a:ln>
+            </p:spPr>
+            <p:style>
+              <a:lnRef idx="1">
+                <a:schemeClr val="accent1"/>
+              </a:lnRef>
+              <a:fillRef idx="0">
+                <a:schemeClr val="accent1"/>
+              </a:fillRef>
+              <a:effectRef idx="0">
+                <a:schemeClr val="accent1"/>
+              </a:effectRef>
+              <a:fontRef idx="minor">
+                <a:schemeClr val="tx1"/>
+              </a:fontRef>
+            </p:style>
+          </p:cxnSp>
+          <p:cxnSp>
+            <p:nvCxnSpPr>
+              <p:cNvPr id="18" name="Straight Arrow Connector 17"/>
+              <p:cNvCxnSpPr/>
+              <p:nvPr/>
+            </p:nvCxnSpPr>
+            <p:spPr>
+              <a:xfrm>
+                <a:off x="4545463" y="4710104"/>
+                <a:ext cx="0" cy="895357"/>
+              </a:xfrm>
+              <a:prstGeom prst="straightConnector1">
+                <a:avLst/>
+              </a:prstGeom>
+              <a:ln w="28575">
+                <a:headEnd type="triangle"/>
+                <a:tailEnd type="triangle"/>
+              </a:ln>
+            </p:spPr>
+            <p:style>
+              <a:lnRef idx="1">
+                <a:schemeClr val="accent1"/>
+              </a:lnRef>
+              <a:fillRef idx="0">
+                <a:schemeClr val="accent1"/>
+              </a:fillRef>
+              <a:effectRef idx="0">
+                <a:schemeClr val="accent1"/>
+              </a:effectRef>
+              <a:fontRef idx="minor">
+                <a:schemeClr val="tx1"/>
+              </a:fontRef>
+            </p:style>
+          </p:cxnSp>
+          <p:cxnSp>
+            <p:nvCxnSpPr>
+              <p:cNvPr id="44" name="Straight Arrow Connector 43"/>
+              <p:cNvCxnSpPr/>
+              <p:nvPr/>
+            </p:nvCxnSpPr>
+            <p:spPr>
+              <a:xfrm>
+                <a:off x="7150980" y="4710104"/>
+                <a:ext cx="0" cy="895357"/>
+              </a:xfrm>
+              <a:prstGeom prst="straightConnector1">
+                <a:avLst/>
+              </a:prstGeom>
+              <a:ln w="28575">
+                <a:headEnd type="triangle"/>
+                <a:tailEnd type="triangle"/>
+              </a:ln>
+            </p:spPr>
+            <p:style>
+              <a:lnRef idx="1">
+                <a:schemeClr val="accent1"/>
+              </a:lnRef>
+              <a:fillRef idx="0">
+                <a:schemeClr val="accent1"/>
+              </a:fillRef>
+              <a:effectRef idx="0">
+                <a:schemeClr val="accent1"/>
+              </a:effectRef>
+              <a:fontRef idx="minor">
+                <a:schemeClr val="tx1"/>
+              </a:fontRef>
+            </p:style>
+          </p:cxnSp>
+        </p:grpSp>
+        <p:sp>
+          <p:nvSpPr>
+            <p:cNvPr id="20" name="TextBox 19"/>
+            <p:cNvSpPr txBox="1"/>
+            <p:nvPr/>
+          </p:nvSpPr>
+          <p:spPr>
+            <a:xfrm>
+              <a:off x="4014660" y="4675046"/>
+              <a:ext cx="1041888" cy="369332"/>
+            </a:xfrm>
+            <a:prstGeom prst="rect">
+              <a:avLst/>
+            </a:prstGeom>
+            <a:solidFill>
+              <a:schemeClr val="bg1"/>
+            </a:solidFill>
+          </p:spPr>
+          <p:txBody>
+            <a:bodyPr wrap="none" rtlCol="0">
+              <a:spAutoFit/>
+            </a:bodyPr>
+            <a:lstStyle/>
+            <a:p>
+              <a:pPr algn="ctr"/>
+              <a:r>
+                <a:rPr lang="en-GB" b="1" dirty="0" smtClean="0">
+                  <a:solidFill>
+                    <a:schemeClr val="accent1"/>
+                  </a:solidFill>
+                </a:rPr>
+                <a:t>c2s HTTP</a:t>
+              </a:r>
+              <a:endParaRPr lang="en-US" b="1" dirty="0">
+                <a:solidFill>
+                  <a:schemeClr val="accent1"/>
+                </a:solidFill>
+              </a:endParaRPr>
+            </a:p>
+          </p:txBody>
+        </p:sp>
+        <p:sp>
+          <p:nvSpPr>
+            <p:cNvPr id="21" name="TextBox 20"/>
+            <p:cNvSpPr txBox="1"/>
+            <p:nvPr/>
+          </p:nvSpPr>
+          <p:spPr>
+            <a:xfrm>
+              <a:off x="5456567" y="4675046"/>
+              <a:ext cx="484427" cy="369332"/>
+            </a:xfrm>
+            <a:prstGeom prst="rect">
+              <a:avLst/>
+            </a:prstGeom>
+            <a:solidFill>
+              <a:schemeClr val="bg1"/>
+            </a:solidFill>
+          </p:spPr>
+          <p:txBody>
+            <a:bodyPr wrap="none" rtlCol="0">
+              <a:spAutoFit/>
+            </a:bodyPr>
+            <a:lstStyle/>
+            <a:p>
+              <a:pPr algn="ctr"/>
+              <a:r>
+                <a:rPr lang="en-GB" b="1" dirty="0" smtClean="0">
+                  <a:solidFill>
+                    <a:srgbClr val="FF0000"/>
+                  </a:solidFill>
+                </a:rPr>
+                <a:t>s</a:t>
+              </a:r>
+              <a:r>
+                <a:rPr lang="en-GB" b="1" dirty="0" smtClean="0">
+                  <a:solidFill>
+                    <a:srgbClr val="FF0000"/>
+                  </a:solidFill>
+                </a:rPr>
+                <a:t>2s</a:t>
+              </a:r>
+              <a:endParaRPr lang="en-US" b="1" dirty="0">
+                <a:solidFill>
+                  <a:srgbClr val="FF0000"/>
+                </a:solidFill>
+              </a:endParaRPr>
+            </a:p>
+          </p:txBody>
+        </p:sp>
+        <p:grpSp>
+          <p:nvGrpSpPr>
+            <p:cNvPr id="8" name="Group 7"/>
+            <p:cNvGrpSpPr/>
+            <p:nvPr/>
+          </p:nvGrpSpPr>
+          <p:grpSpPr>
+            <a:xfrm>
+              <a:off x="4343511" y="3312722"/>
+              <a:ext cx="1681937" cy="1199262"/>
+              <a:chOff x="3891651" y="3663242"/>
+              <a:chExt cx="1390031" cy="1199262"/>
+            </a:xfrm>
+          </p:grpSpPr>
+          <p:grpSp>
+            <p:nvGrpSpPr>
+              <p:cNvPr id="35" name="Group 34"/>
+              <p:cNvGrpSpPr/>
+              <p:nvPr/>
+            </p:nvGrpSpPr>
+            <p:grpSpPr>
+              <a:xfrm>
+                <a:off x="4015343" y="3663242"/>
+                <a:ext cx="1266339" cy="1077151"/>
+                <a:chOff x="5512054" y="3785353"/>
+                <a:chExt cx="1266339" cy="1077151"/>
+              </a:xfrm>
+            </p:grpSpPr>
+            <p:sp>
+              <p:nvSpPr>
+                <p:cNvPr id="41" name="Rectangle 40"/>
+                <p:cNvSpPr/>
+                <p:nvPr/>
+              </p:nvSpPr>
+              <p:spPr>
+                <a:xfrm>
+                  <a:off x="5512054" y="3795705"/>
+                  <a:ext cx="1263148" cy="1066799"/>
+                </a:xfrm>
+                <a:prstGeom prst="rect">
+                  <a:avLst/>
+                </a:prstGeom>
+              </p:spPr>
+              <p:style>
+                <a:lnRef idx="2">
+                  <a:schemeClr val="dk1"/>
+                </a:lnRef>
+                <a:fillRef idx="1">
+                  <a:schemeClr val="lt1"/>
+                </a:fillRef>
+                <a:effectRef idx="0">
+                  <a:schemeClr val="dk1"/>
+                </a:effectRef>
+                <a:fontRef idx="minor">
+                  <a:schemeClr val="dk1"/>
+                </a:fontRef>
+              </p:style>
+              <p:txBody>
+                <a:bodyPr rtlCol="0" anchor="ctr"/>
+                <a:lstStyle/>
+                <a:p>
+                  <a:pPr algn="ctr"/>
+                  <a:endParaRPr lang="en-US" dirty="0"/>
+                </a:p>
+              </p:txBody>
+            </p:sp>
+            <p:sp>
+              <p:nvSpPr>
+                <p:cNvPr id="42" name="Rectangle 41"/>
+                <p:cNvSpPr/>
+                <p:nvPr/>
+              </p:nvSpPr>
+              <p:spPr>
+                <a:xfrm>
+                  <a:off x="6210613" y="3785353"/>
+                  <a:ext cx="567780" cy="290520"/>
+                </a:xfrm>
+                <a:prstGeom prst="rect">
+                  <a:avLst/>
+                </a:prstGeom>
+              </p:spPr>
+              <p:style>
+                <a:lnRef idx="2">
+                  <a:schemeClr val="accent2">
+                    <a:shade val="50000"/>
+                  </a:schemeClr>
+                </a:lnRef>
+                <a:fillRef idx="1">
+                  <a:schemeClr val="accent2"/>
+                </a:fillRef>
+                <a:effectRef idx="0">
+                  <a:schemeClr val="accent2"/>
+                </a:effectRef>
+                <a:fontRef idx="minor">
+                  <a:schemeClr val="lt1"/>
+                </a:fontRef>
+              </p:style>
+              <p:txBody>
+                <a:bodyPr rtlCol="0" anchor="ctr"/>
+                <a:lstStyle/>
+                <a:p>
+                  <a:pPr algn="ctr"/>
+                  <a:r>
+                    <a:rPr lang="en-US" sz="1200" b="1" dirty="0" smtClean="0"/>
+                    <a:t>cache</a:t>
+                  </a:r>
+                  <a:endParaRPr lang="en-US" sz="1200" b="1" dirty="0"/>
+                </a:p>
+              </p:txBody>
+            </p:sp>
+          </p:grpSp>
+          <p:grpSp>
+            <p:nvGrpSpPr>
+              <p:cNvPr id="3" name="Group 2"/>
+              <p:cNvGrpSpPr/>
+              <p:nvPr/>
+            </p:nvGrpSpPr>
+            <p:grpSpPr>
+              <a:xfrm>
+                <a:off x="3951657" y="3722380"/>
+                <a:ext cx="1266339" cy="1077151"/>
+                <a:chOff x="5512054" y="3785353"/>
+                <a:chExt cx="1266339" cy="1077151"/>
+              </a:xfrm>
+            </p:grpSpPr>
+            <p:sp>
+              <p:nvSpPr>
+                <p:cNvPr id="26" name="Rectangle 25"/>
+                <p:cNvSpPr/>
+                <p:nvPr/>
+              </p:nvSpPr>
+              <p:spPr>
+                <a:xfrm>
+                  <a:off x="5512054" y="3795705"/>
+                  <a:ext cx="1263148" cy="1066799"/>
+                </a:xfrm>
+                <a:prstGeom prst="rect">
+                  <a:avLst/>
+                </a:prstGeom>
+              </p:spPr>
+              <p:style>
+                <a:lnRef idx="2">
+                  <a:schemeClr val="dk1"/>
+                </a:lnRef>
+                <a:fillRef idx="1">
+                  <a:schemeClr val="lt1"/>
+                </a:fillRef>
+                <a:effectRef idx="0">
+                  <a:schemeClr val="dk1"/>
+                </a:effectRef>
+                <a:fontRef idx="minor">
+                  <a:schemeClr val="dk1"/>
+                </a:fontRef>
+              </p:style>
+              <p:txBody>
+                <a:bodyPr rtlCol="0" anchor="ctr"/>
+                <a:lstStyle/>
+                <a:p>
+                  <a:pPr algn="ctr"/>
+                  <a:endParaRPr lang="en-US" dirty="0"/>
+                </a:p>
+              </p:txBody>
+            </p:sp>
+            <p:sp>
+              <p:nvSpPr>
+                <p:cNvPr id="53" name="Rectangle 52"/>
+                <p:cNvSpPr/>
+                <p:nvPr/>
+              </p:nvSpPr>
+              <p:spPr>
+                <a:xfrm>
+                  <a:off x="6210613" y="3785353"/>
+                  <a:ext cx="567780" cy="290520"/>
+                </a:xfrm>
+                <a:prstGeom prst="rect">
+                  <a:avLst/>
+                </a:prstGeom>
+              </p:spPr>
+              <p:style>
+                <a:lnRef idx="2">
+                  <a:schemeClr val="accent2">
+                    <a:shade val="50000"/>
+                  </a:schemeClr>
+                </a:lnRef>
+                <a:fillRef idx="1">
+                  <a:schemeClr val="accent2"/>
+                </a:fillRef>
+                <a:effectRef idx="0">
+                  <a:schemeClr val="accent2"/>
+                </a:effectRef>
+                <a:fontRef idx="minor">
+                  <a:schemeClr val="lt1"/>
+                </a:fontRef>
+              </p:style>
+              <p:txBody>
+                <a:bodyPr rtlCol="0" anchor="ctr"/>
+                <a:lstStyle/>
+                <a:p>
+                  <a:pPr algn="ctr"/>
+                  <a:r>
+                    <a:rPr lang="en-US" sz="1200" b="1" dirty="0" smtClean="0"/>
+                    <a:t>cache</a:t>
+                  </a:r>
+                  <a:endParaRPr lang="en-US" sz="1200" b="1" dirty="0"/>
+                </a:p>
+              </p:txBody>
+            </p:sp>
+          </p:grpSp>
+          <p:grpSp>
+            <p:nvGrpSpPr>
+              <p:cNvPr id="5" name="Group 4"/>
+              <p:cNvGrpSpPr/>
+              <p:nvPr/>
+            </p:nvGrpSpPr>
+            <p:grpSpPr>
+              <a:xfrm>
+                <a:off x="3891651" y="3785353"/>
+                <a:ext cx="1263149" cy="1077151"/>
+                <a:chOff x="3891651" y="3785353"/>
+                <a:chExt cx="1263149" cy="1077151"/>
+              </a:xfrm>
+            </p:grpSpPr>
+            <p:sp>
+              <p:nvSpPr>
+                <p:cNvPr id="7" name="Rectangle 6"/>
+                <p:cNvSpPr/>
+                <p:nvPr/>
+              </p:nvSpPr>
+              <p:spPr>
+                <a:xfrm>
+                  <a:off x="3891651" y="3795705"/>
+                  <a:ext cx="1263148" cy="1066799"/>
+                </a:xfrm>
+                <a:prstGeom prst="rect">
+                  <a:avLst/>
+                </a:prstGeom>
+              </p:spPr>
+              <p:style>
+                <a:lnRef idx="2">
+                  <a:schemeClr val="dk1"/>
+                </a:lnRef>
+                <a:fillRef idx="1">
+                  <a:schemeClr val="lt1"/>
+                </a:fillRef>
+                <a:effectRef idx="0">
+                  <a:schemeClr val="dk1"/>
+                </a:effectRef>
+                <a:fontRef idx="minor">
+                  <a:schemeClr val="dk1"/>
+                </a:fontRef>
+              </p:style>
+              <p:txBody>
+                <a:bodyPr rtlCol="0" anchor="ctr"/>
+                <a:lstStyle/>
+                <a:p>
+                  <a:pPr algn="ctr"/>
+                  <a:r>
+                    <a:rPr lang="en-GB" dirty="0" smtClean="0"/>
+                    <a:t>HTTP Childs</a:t>
+                  </a:r>
+                  <a:endParaRPr lang="en-US" dirty="0"/>
+                </a:p>
+              </p:txBody>
+            </p:sp>
+            <p:sp>
+              <p:nvSpPr>
+                <p:cNvPr id="2" name="Rectangle 1"/>
+                <p:cNvSpPr/>
+                <p:nvPr/>
+              </p:nvSpPr>
+              <p:spPr>
+                <a:xfrm>
+                  <a:off x="4587020" y="3785353"/>
+                  <a:ext cx="567780" cy="290520"/>
+                </a:xfrm>
+                <a:prstGeom prst="rect">
+                  <a:avLst/>
+                </a:prstGeom>
+              </p:spPr>
+              <p:style>
+                <a:lnRef idx="2">
+                  <a:schemeClr val="accent2">
+                    <a:shade val="50000"/>
+                  </a:schemeClr>
+                </a:lnRef>
+                <a:fillRef idx="1">
+                  <a:schemeClr val="accent2"/>
+                </a:fillRef>
+                <a:effectRef idx="0">
+                  <a:schemeClr val="accent2"/>
+                </a:effectRef>
+                <a:fontRef idx="minor">
+                  <a:schemeClr val="lt1"/>
+                </a:fontRef>
+              </p:style>
+              <p:txBody>
+                <a:bodyPr rtlCol="0" anchor="ctr"/>
+                <a:lstStyle/>
+                <a:p>
+                  <a:pPr algn="ctr"/>
+                  <a:r>
+                    <a:rPr lang="en-US" sz="1200" b="1" dirty="0" smtClean="0"/>
+                    <a:t>cache</a:t>
+                  </a:r>
+                  <a:endParaRPr lang="en-US" sz="1200" b="1" dirty="0"/>
+                </a:p>
+              </p:txBody>
+            </p:sp>
+          </p:grpSp>
+        </p:grpSp>
+        <p:sp>
+          <p:nvSpPr>
+            <p:cNvPr id="46" name="TextBox 45"/>
+            <p:cNvSpPr txBox="1"/>
+            <p:nvPr/>
+          </p:nvSpPr>
+          <p:spPr>
+            <a:xfrm>
+              <a:off x="6574457" y="4675046"/>
+              <a:ext cx="1124923" cy="369332"/>
+            </a:xfrm>
+            <a:prstGeom prst="rect">
+              <a:avLst/>
+            </a:prstGeom>
+            <a:solidFill>
+              <a:schemeClr val="bg1"/>
+            </a:solidFill>
+          </p:spPr>
+          <p:txBody>
+            <a:bodyPr wrap="none" rtlCol="0">
+              <a:spAutoFit/>
+            </a:bodyPr>
+            <a:lstStyle/>
+            <a:p>
+              <a:pPr algn="ctr"/>
+              <a:r>
+                <a:rPr lang="en-GB" b="1" dirty="0">
+                  <a:solidFill>
+                    <a:schemeClr val="accent1"/>
+                  </a:solidFill>
+                </a:rPr>
+                <a:t>c2s </a:t>
+              </a:r>
+              <a:r>
+                <a:rPr lang="en-GB" b="1" dirty="0" smtClean="0">
+                  <a:solidFill>
+                    <a:schemeClr val="accent1"/>
+                  </a:solidFill>
+                </a:rPr>
+                <a:t>Telnet</a:t>
+              </a:r>
+              <a:endParaRPr lang="en-US" b="1" dirty="0">
+                <a:solidFill>
+                  <a:schemeClr val="accent1"/>
+                </a:solidFill>
+              </a:endParaRPr>
+            </a:p>
+          </p:txBody>
+        </p:sp>
+        <p:grpSp>
+          <p:nvGrpSpPr>
+            <p:cNvPr id="49" name="Group 48"/>
+            <p:cNvGrpSpPr/>
+            <p:nvPr/>
+          </p:nvGrpSpPr>
+          <p:grpSpPr>
+            <a:xfrm>
+              <a:off x="6369908" y="3312722"/>
+              <a:ext cx="1681937" cy="1199262"/>
+              <a:chOff x="3891651" y="3663242"/>
+              <a:chExt cx="1390031" cy="1199262"/>
+            </a:xfrm>
+          </p:grpSpPr>
+          <p:grpSp>
+            <p:nvGrpSpPr>
+              <p:cNvPr id="51" name="Group 50"/>
+              <p:cNvGrpSpPr/>
+              <p:nvPr/>
+            </p:nvGrpSpPr>
+            <p:grpSpPr>
+              <a:xfrm>
+                <a:off x="4015343" y="3663242"/>
+                <a:ext cx="1266339" cy="1077151"/>
+                <a:chOff x="5512054" y="3785353"/>
+                <a:chExt cx="1266339" cy="1077151"/>
+              </a:xfrm>
+            </p:grpSpPr>
+            <p:sp>
+              <p:nvSpPr>
+                <p:cNvPr id="65" name="Rectangle 64"/>
+                <p:cNvSpPr/>
+                <p:nvPr/>
+              </p:nvSpPr>
+              <p:spPr>
+                <a:xfrm>
+                  <a:off x="5512054" y="3795705"/>
+                  <a:ext cx="1263148" cy="1066799"/>
+                </a:xfrm>
+                <a:prstGeom prst="rect">
+                  <a:avLst/>
+                </a:prstGeom>
+              </p:spPr>
+              <p:style>
+                <a:lnRef idx="2">
+                  <a:schemeClr val="dk1"/>
+                </a:lnRef>
+                <a:fillRef idx="1">
+                  <a:schemeClr val="lt1"/>
+                </a:fillRef>
+                <a:effectRef idx="0">
+                  <a:schemeClr val="dk1"/>
+                </a:effectRef>
+                <a:fontRef idx="minor">
+                  <a:schemeClr val="dk1"/>
+                </a:fontRef>
+              </p:style>
+              <p:txBody>
+                <a:bodyPr rtlCol="0" anchor="ctr"/>
+                <a:lstStyle/>
+                <a:p>
+                  <a:pPr algn="ctr"/>
+                  <a:endParaRPr lang="en-US" dirty="0"/>
+                </a:p>
+              </p:txBody>
+            </p:sp>
+            <p:sp>
+              <p:nvSpPr>
+                <p:cNvPr id="66" name="Rectangle 65"/>
+                <p:cNvSpPr/>
+                <p:nvPr/>
+              </p:nvSpPr>
+              <p:spPr>
+                <a:xfrm>
+                  <a:off x="6210613" y="3785353"/>
+                  <a:ext cx="567780" cy="290520"/>
+                </a:xfrm>
+                <a:prstGeom prst="rect">
+                  <a:avLst/>
+                </a:prstGeom>
+              </p:spPr>
+              <p:style>
+                <a:lnRef idx="2">
+                  <a:schemeClr val="accent2">
+                    <a:shade val="50000"/>
+                  </a:schemeClr>
+                </a:lnRef>
+                <a:fillRef idx="1">
+                  <a:schemeClr val="accent2"/>
+                </a:fillRef>
+                <a:effectRef idx="0">
+                  <a:schemeClr val="accent2"/>
+                </a:effectRef>
+                <a:fontRef idx="minor">
+                  <a:schemeClr val="lt1"/>
+                </a:fontRef>
+              </p:style>
+              <p:txBody>
+                <a:bodyPr rtlCol="0" anchor="ctr"/>
+                <a:lstStyle/>
+                <a:p>
+                  <a:pPr algn="ctr"/>
+                  <a:r>
+                    <a:rPr lang="en-US" sz="1200" b="1" dirty="0" smtClean="0"/>
+                    <a:t>cache</a:t>
+                  </a:r>
+                  <a:endParaRPr lang="en-US" sz="1200" b="1" dirty="0"/>
+                </a:p>
+              </p:txBody>
+            </p:sp>
+          </p:grpSp>
+          <p:grpSp>
+            <p:nvGrpSpPr>
+              <p:cNvPr id="56" name="Group 55"/>
+              <p:cNvGrpSpPr/>
+              <p:nvPr/>
+            </p:nvGrpSpPr>
+            <p:grpSpPr>
+              <a:xfrm>
+                <a:off x="3951657" y="3722380"/>
+                <a:ext cx="1266339" cy="1077151"/>
+                <a:chOff x="5512054" y="3785353"/>
+                <a:chExt cx="1266339" cy="1077151"/>
+              </a:xfrm>
+            </p:grpSpPr>
+            <p:sp>
+              <p:nvSpPr>
+                <p:cNvPr id="63" name="Rectangle 62"/>
+                <p:cNvSpPr/>
+                <p:nvPr/>
+              </p:nvSpPr>
+              <p:spPr>
+                <a:xfrm>
+                  <a:off x="5512054" y="3795705"/>
+                  <a:ext cx="1263148" cy="1066799"/>
+                </a:xfrm>
+                <a:prstGeom prst="rect">
+                  <a:avLst/>
+                </a:prstGeom>
+              </p:spPr>
+              <p:style>
+                <a:lnRef idx="2">
+                  <a:schemeClr val="dk1"/>
+                </a:lnRef>
+                <a:fillRef idx="1">
+                  <a:schemeClr val="lt1"/>
+                </a:fillRef>
+                <a:effectRef idx="0">
+                  <a:schemeClr val="dk1"/>
+                </a:effectRef>
+                <a:fontRef idx="minor">
+                  <a:schemeClr val="dk1"/>
+                </a:fontRef>
+              </p:style>
+              <p:txBody>
+                <a:bodyPr rtlCol="0" anchor="ctr"/>
+                <a:lstStyle/>
+                <a:p>
+                  <a:pPr algn="ctr"/>
+                  <a:endParaRPr lang="en-US" dirty="0"/>
+                </a:p>
+              </p:txBody>
+            </p:sp>
+            <p:sp>
+              <p:nvSpPr>
+                <p:cNvPr id="64" name="Rectangle 63"/>
+                <p:cNvSpPr/>
+                <p:nvPr/>
+              </p:nvSpPr>
+              <p:spPr>
+                <a:xfrm>
+                  <a:off x="6210613" y="3785353"/>
+                  <a:ext cx="567780" cy="290520"/>
+                </a:xfrm>
+                <a:prstGeom prst="rect">
+                  <a:avLst/>
+                </a:prstGeom>
+              </p:spPr>
+              <p:style>
+                <a:lnRef idx="2">
+                  <a:schemeClr val="accent2">
+                    <a:shade val="50000"/>
+                  </a:schemeClr>
+                </a:lnRef>
+                <a:fillRef idx="1">
+                  <a:schemeClr val="accent2"/>
+                </a:fillRef>
+                <a:effectRef idx="0">
+                  <a:schemeClr val="accent2"/>
+                </a:effectRef>
+                <a:fontRef idx="minor">
+                  <a:schemeClr val="lt1"/>
+                </a:fontRef>
+              </p:style>
+              <p:txBody>
+                <a:bodyPr rtlCol="0" anchor="ctr"/>
+                <a:lstStyle/>
+                <a:p>
+                  <a:pPr algn="ctr"/>
+                  <a:r>
+                    <a:rPr lang="en-US" sz="1200" b="1" dirty="0" smtClean="0"/>
+                    <a:t>cache</a:t>
+                  </a:r>
+                  <a:endParaRPr lang="en-US" sz="1200" b="1" dirty="0"/>
+                </a:p>
+              </p:txBody>
+            </p:sp>
+          </p:grpSp>
+          <p:grpSp>
+            <p:nvGrpSpPr>
+              <p:cNvPr id="57" name="Group 56"/>
+              <p:cNvGrpSpPr/>
+              <p:nvPr/>
+            </p:nvGrpSpPr>
+            <p:grpSpPr>
+              <a:xfrm>
+                <a:off x="3891651" y="3785353"/>
+                <a:ext cx="1263149" cy="1077151"/>
+                <a:chOff x="3891651" y="3785353"/>
+                <a:chExt cx="1263149" cy="1077151"/>
+              </a:xfrm>
+            </p:grpSpPr>
+            <p:sp>
+              <p:nvSpPr>
+                <p:cNvPr id="61" name="Rectangle 60"/>
+                <p:cNvSpPr/>
+                <p:nvPr/>
+              </p:nvSpPr>
+              <p:spPr>
+                <a:xfrm>
+                  <a:off x="3891651" y="3795705"/>
+                  <a:ext cx="1263148" cy="1066799"/>
+                </a:xfrm>
+                <a:prstGeom prst="rect">
+                  <a:avLst/>
+                </a:prstGeom>
+              </p:spPr>
+              <p:style>
+                <a:lnRef idx="2">
+                  <a:schemeClr val="dk1"/>
+                </a:lnRef>
+                <a:fillRef idx="1">
+                  <a:schemeClr val="lt1"/>
+                </a:fillRef>
+                <a:effectRef idx="0">
+                  <a:schemeClr val="dk1"/>
+                </a:effectRef>
+                <a:fontRef idx="minor">
+                  <a:schemeClr val="dk1"/>
+                </a:fontRef>
+              </p:style>
+              <p:txBody>
+                <a:bodyPr rtlCol="0" anchor="ctr"/>
+                <a:lstStyle/>
+                <a:p>
+                  <a:pPr algn="ctr"/>
+                  <a:r>
+                    <a:rPr lang="en-GB" dirty="0" smtClean="0"/>
+                    <a:t>Telnet Childs</a:t>
+                  </a:r>
+                  <a:endParaRPr lang="en-US" dirty="0"/>
+                </a:p>
+              </p:txBody>
+            </p:sp>
+            <p:sp>
+              <p:nvSpPr>
+                <p:cNvPr id="62" name="Rectangle 61"/>
+                <p:cNvSpPr/>
+                <p:nvPr/>
+              </p:nvSpPr>
+              <p:spPr>
+                <a:xfrm>
+                  <a:off x="4587020" y="3785353"/>
+                  <a:ext cx="567780" cy="290520"/>
+                </a:xfrm>
+                <a:prstGeom prst="rect">
+                  <a:avLst/>
+                </a:prstGeom>
+              </p:spPr>
+              <p:style>
+                <a:lnRef idx="2">
+                  <a:schemeClr val="accent2">
+                    <a:shade val="50000"/>
+                  </a:schemeClr>
+                </a:lnRef>
+                <a:fillRef idx="1">
+                  <a:schemeClr val="accent2"/>
+                </a:fillRef>
+                <a:effectRef idx="0">
+                  <a:schemeClr val="accent2"/>
+                </a:effectRef>
+                <a:fontRef idx="minor">
+                  <a:schemeClr val="lt1"/>
+                </a:fontRef>
+              </p:style>
+              <p:txBody>
+                <a:bodyPr rtlCol="0" anchor="ctr"/>
+                <a:lstStyle/>
+                <a:p>
+                  <a:pPr algn="ctr"/>
+                  <a:r>
+                    <a:rPr lang="en-US" sz="1200" b="1" dirty="0" smtClean="0"/>
+                    <a:t>cache</a:t>
+                  </a:r>
+                  <a:endParaRPr lang="en-US" sz="1200" b="1" dirty="0"/>
+                </a:p>
+              </p:txBody>
+            </p:sp>
+          </p:grpSp>
+        </p:grpSp>
+      </p:grpSp>
+      <p:sp>
+        <p:nvSpPr>
+          <p:cNvPr id="22" name="Rectangle 21"/>
           <p:cNvSpPr/>
           <p:nvPr/>
         </p:nvSpPr>
         <p:spPr>
           <a:xfrm>
-            <a:off x="4587020" y="3785353"/>
-            <a:ext cx="567780" cy="290520"/>
+            <a:off x="3762421" y="5026342"/>
+            <a:ext cx="4028982" cy="336094"/>
           </a:xfrm>
           <a:prstGeom prst="rect">
             <a:avLst/>
@@ -23779,15 +24140,15 @@
         </p:spPr>
         <p:style>
           <a:lnRef idx="2">
-            <a:schemeClr val="accent2">
+            <a:schemeClr val="accent1">
               <a:shade val="50000"/>
             </a:schemeClr>
           </a:lnRef>
           <a:fillRef idx="1">
-            <a:schemeClr val="accent2"/>
+            <a:schemeClr val="accent1"/>
           </a:fillRef>
           <a:effectRef idx="0">
-            <a:schemeClr val="accent2"/>
+            <a:schemeClr val="accent1"/>
           </a:effectRef>
           <a:fontRef idx="minor">
             <a:schemeClr val="lt1"/>
@@ -23799,240 +24160,35 @@
           <a:p>
             <a:pPr algn="ctr"/>
             <a:r>
-              <a:rPr lang="en-US" sz="1200" b="1" dirty="0" smtClean="0"/>
-              <a:t>cache</a:t>
-            </a:r>
-            <a:endParaRPr lang="en-US" sz="1200" b="1" dirty="0"/>
-          </a:p>
-        </p:txBody>
-      </p:sp>
-      <p:sp>
-        <p:nvSpPr>
-          <p:cNvPr id="53" name="Rectangle 52"/>
-          <p:cNvSpPr/>
-          <p:nvPr/>
-        </p:nvSpPr>
-        <p:spPr>
-          <a:xfrm>
-            <a:off x="6210613" y="3785353"/>
-            <a:ext cx="567780" cy="290520"/>
-          </a:xfrm>
-          <a:prstGeom prst="rect">
-            <a:avLst/>
-          </a:prstGeom>
-        </p:spPr>
-        <p:style>
-          <a:lnRef idx="2">
-            <a:schemeClr val="accent2">
-              <a:shade val="50000"/>
-            </a:schemeClr>
-          </a:lnRef>
-          <a:fillRef idx="1">
-            <a:schemeClr val="accent2"/>
-          </a:fillRef>
-          <a:effectRef idx="0">
-            <a:schemeClr val="accent2"/>
-          </a:effectRef>
-          <a:fontRef idx="minor">
-            <a:schemeClr val="lt1"/>
-          </a:fontRef>
-        </p:style>
-        <p:txBody>
-          <a:bodyPr rtlCol="0" anchor="ctr"/>
-          <a:lstStyle/>
-          <a:p>
-            <a:pPr algn="ctr"/>
-            <a:r>
-              <a:rPr lang="en-US" sz="1200" b="1" dirty="0" smtClean="0"/>
-              <a:t>cache</a:t>
-            </a:r>
-            <a:endParaRPr lang="en-US" sz="1200" b="1" dirty="0"/>
-          </a:p>
-        </p:txBody>
-      </p:sp>
-      <p:sp>
-        <p:nvSpPr>
-          <p:cNvPr id="58" name="Rectangle 57"/>
-          <p:cNvSpPr/>
-          <p:nvPr/>
-        </p:nvSpPr>
-        <p:spPr>
-          <a:xfrm>
-            <a:off x="7827824" y="3785353"/>
-            <a:ext cx="567780" cy="290520"/>
-          </a:xfrm>
-          <a:prstGeom prst="rect">
-            <a:avLst/>
-          </a:prstGeom>
-        </p:spPr>
-        <p:style>
-          <a:lnRef idx="2">
-            <a:schemeClr val="accent2">
-              <a:shade val="50000"/>
-            </a:schemeClr>
-          </a:lnRef>
-          <a:fillRef idx="1">
-            <a:schemeClr val="accent2"/>
-          </a:fillRef>
-          <a:effectRef idx="0">
-            <a:schemeClr val="accent2"/>
-          </a:effectRef>
-          <a:fontRef idx="minor">
-            <a:schemeClr val="lt1"/>
-          </a:fontRef>
-        </p:style>
-        <p:txBody>
-          <a:bodyPr rtlCol="0" anchor="ctr"/>
-          <a:lstStyle/>
-          <a:p>
-            <a:pPr algn="ctr"/>
-            <a:r>
-              <a:rPr lang="en-US" sz="1200" b="1" dirty="0" smtClean="0"/>
-              <a:t>cache</a:t>
-            </a:r>
-            <a:endParaRPr lang="en-US" sz="1200" b="1" dirty="0"/>
-          </a:p>
-        </p:txBody>
-      </p:sp>
-      <p:sp>
-        <p:nvSpPr>
-          <p:cNvPr id="12" name="Up-Down Arrow 11"/>
-          <p:cNvSpPr/>
-          <p:nvPr/>
-        </p:nvSpPr>
-        <p:spPr>
-          <a:xfrm>
-            <a:off x="4306321" y="3371846"/>
-            <a:ext cx="433808" cy="552454"/>
-          </a:xfrm>
-          <a:prstGeom prst="upDownArrow">
-            <a:avLst/>
-          </a:prstGeom>
-        </p:spPr>
-        <p:style>
-          <a:lnRef idx="2">
-            <a:schemeClr val="accent4">
-              <a:shade val="50000"/>
-            </a:schemeClr>
-          </a:lnRef>
-          <a:fillRef idx="1">
-            <a:schemeClr val="accent4"/>
-          </a:fillRef>
-          <a:effectRef idx="0">
-            <a:schemeClr val="accent4"/>
-          </a:effectRef>
-          <a:fontRef idx="minor">
-            <a:schemeClr val="lt1"/>
-          </a:fontRef>
-        </p:style>
-        <p:txBody>
-          <a:bodyPr rtlCol="0" anchor="ctr"/>
-          <a:lstStyle/>
-          <a:p>
-            <a:pPr algn="ctr"/>
-            <a:endParaRPr lang="en-US"/>
-          </a:p>
-        </p:txBody>
-      </p:sp>
-      <p:sp>
-        <p:nvSpPr>
-          <p:cNvPr id="13" name="Up-Down Arrow 12"/>
-          <p:cNvSpPr/>
-          <p:nvPr/>
-        </p:nvSpPr>
-        <p:spPr>
-          <a:xfrm>
-            <a:off x="5926723" y="3371846"/>
-            <a:ext cx="433808" cy="552454"/>
-          </a:xfrm>
-          <a:prstGeom prst="upDownArrow">
-            <a:avLst/>
-          </a:prstGeom>
-        </p:spPr>
-        <p:style>
-          <a:lnRef idx="2">
-            <a:schemeClr val="accent4">
-              <a:shade val="50000"/>
-            </a:schemeClr>
-          </a:lnRef>
-          <a:fillRef idx="1">
-            <a:schemeClr val="accent4"/>
-          </a:fillRef>
-          <a:effectRef idx="0">
-            <a:schemeClr val="accent4"/>
-          </a:effectRef>
-          <a:fontRef idx="minor">
-            <a:schemeClr val="lt1"/>
-          </a:fontRef>
-        </p:style>
-        <p:txBody>
-          <a:bodyPr rtlCol="0" anchor="ctr"/>
-          <a:lstStyle/>
-          <a:p>
-            <a:pPr algn="ctr"/>
-            <a:endParaRPr lang="en-US"/>
-          </a:p>
-        </p:txBody>
-      </p:sp>
-      <p:sp>
-        <p:nvSpPr>
-          <p:cNvPr id="14" name="Up-Down Arrow 13"/>
-          <p:cNvSpPr/>
-          <p:nvPr/>
-        </p:nvSpPr>
-        <p:spPr>
-          <a:xfrm>
-            <a:off x="7547126" y="3371846"/>
-            <a:ext cx="433808" cy="552454"/>
-          </a:xfrm>
-          <a:prstGeom prst="upDownArrow">
-            <a:avLst/>
-          </a:prstGeom>
-        </p:spPr>
-        <p:style>
-          <a:lnRef idx="2">
-            <a:schemeClr val="accent4">
-              <a:shade val="50000"/>
-            </a:schemeClr>
-          </a:lnRef>
-          <a:fillRef idx="1">
-            <a:schemeClr val="accent4"/>
-          </a:fillRef>
-          <a:effectRef idx="0">
-            <a:schemeClr val="accent4"/>
-          </a:effectRef>
-          <a:fontRef idx="minor">
-            <a:schemeClr val="lt1"/>
-          </a:fontRef>
-        </p:style>
-        <p:txBody>
-          <a:bodyPr rtlCol="0" anchor="ctr"/>
-          <a:lstStyle/>
-          <a:p>
-            <a:pPr algn="ctr"/>
-            <a:endParaRPr lang="en-US"/>
+              <a:rPr lang="en-US" b="1" dirty="0" err="1" smtClean="0"/>
+              <a:t>libuv</a:t>
+            </a:r>
+            <a:endParaRPr lang="en-US" b="1" dirty="0"/>
           </a:p>
         </p:txBody>
       </p:sp>
       <p:cxnSp>
         <p:nvCxnSpPr>
-          <p:cNvPr id="59" name="Straight Arrow Connector 58"/>
-          <p:cNvCxnSpPr/>
+          <p:cNvPr id="24" name="Elbow Connector 23"/>
+          <p:cNvCxnSpPr>
+            <a:stCxn id="76" idx="2"/>
+            <a:endCxn id="48" idx="3"/>
+          </p:cNvCxnSpPr>
           <p:nvPr/>
         </p:nvCxnSpPr>
         <p:spPr>
-          <a:xfrm rot="5400000" flipH="1" flipV="1">
-            <a:off x="2628584" y="3154473"/>
-            <a:ext cx="3912487" cy="1825426"/>
+          <a:xfrm rot="16200000" flipH="1">
+            <a:off x="5620412" y="5854896"/>
+            <a:ext cx="313123" cy="123"/>
           </a:xfrm>
           <a:prstGeom prst="bentConnector3">
             <a:avLst>
-              <a:gd name="adj1" fmla="val 99974"/>
+              <a:gd name="adj1" fmla="val 50000"/>
             </a:avLst>
           </a:prstGeom>
           <a:ln w="28575">
             <a:solidFill>
-              <a:srgbClr val="FF0000"/>
+              <a:srgbClr val="FFC000"/>
             </a:solidFill>
             <a:headEnd type="triangle"/>
             <a:tailEnd type="triangle"/>
@@ -24055,42 +24211,131 @@
       </p:cxnSp>
       <p:sp>
         <p:nvSpPr>
-          <p:cNvPr id="60" name="TextBox 59"/>
-          <p:cNvSpPr txBox="1"/>
+          <p:cNvPr id="73" name="Up-Down Arrow 72"/>
+          <p:cNvSpPr/>
           <p:nvPr/>
         </p:nvSpPr>
         <p:spPr>
           <a:xfrm>
-            <a:off x="4135101" y="1904029"/>
-            <a:ext cx="503574" cy="369332"/>
+            <a:off x="5310153" y="2924824"/>
+            <a:ext cx="263104" cy="422643"/>
+          </a:xfrm>
+          <a:prstGeom prst="upDownArrow">
+            <a:avLst>
+              <a:gd name="adj1" fmla="val 35948"/>
+              <a:gd name="adj2" fmla="val 39461"/>
+            </a:avLst>
+          </a:prstGeom>
+        </p:spPr>
+        <p:style>
+          <a:lnRef idx="2">
+            <a:schemeClr val="accent4">
+              <a:shade val="50000"/>
+            </a:schemeClr>
+          </a:lnRef>
+          <a:fillRef idx="1">
+            <a:schemeClr val="accent4"/>
+          </a:fillRef>
+          <a:effectRef idx="0">
+            <a:schemeClr val="accent4"/>
+          </a:effectRef>
+          <a:fontRef idx="minor">
+            <a:schemeClr val="lt1"/>
+          </a:fontRef>
+        </p:style>
+        <p:txBody>
+          <a:bodyPr rtlCol="0" anchor="ctr"/>
+          <a:lstStyle/>
+          <a:p>
+            <a:pPr algn="ctr"/>
+            <a:endParaRPr lang="en-US"/>
+          </a:p>
+        </p:txBody>
+      </p:sp>
+      <p:sp>
+        <p:nvSpPr>
+          <p:cNvPr id="74" name="Up-Down Arrow 73"/>
+          <p:cNvSpPr/>
+          <p:nvPr/>
+        </p:nvSpPr>
+        <p:spPr>
+          <a:xfrm>
+            <a:off x="7338003" y="2924824"/>
+            <a:ext cx="263104" cy="422643"/>
+          </a:xfrm>
+          <a:prstGeom prst="upDownArrow">
+            <a:avLst>
+              <a:gd name="adj1" fmla="val 35948"/>
+              <a:gd name="adj2" fmla="val 39461"/>
+            </a:avLst>
+          </a:prstGeom>
+        </p:spPr>
+        <p:style>
+          <a:lnRef idx="2">
+            <a:schemeClr val="accent4">
+              <a:shade val="50000"/>
+            </a:schemeClr>
+          </a:lnRef>
+          <a:fillRef idx="1">
+            <a:schemeClr val="accent4"/>
+          </a:fillRef>
+          <a:effectRef idx="0">
+            <a:schemeClr val="accent4"/>
+          </a:effectRef>
+          <a:fontRef idx="minor">
+            <a:schemeClr val="lt1"/>
+          </a:fontRef>
+        </p:style>
+        <p:txBody>
+          <a:bodyPr rtlCol="0" anchor="ctr"/>
+          <a:lstStyle/>
+          <a:p>
+            <a:pPr algn="ctr"/>
+            <a:endParaRPr lang="en-US"/>
+          </a:p>
+        </p:txBody>
+      </p:sp>
+      <p:sp>
+        <p:nvSpPr>
+          <p:cNvPr id="76" name="Rectangle 75"/>
+          <p:cNvSpPr/>
+          <p:nvPr/>
+        </p:nvSpPr>
+        <p:spPr>
+          <a:xfrm>
+            <a:off x="3762421" y="5362303"/>
+            <a:ext cx="4028982" cy="336094"/>
           </a:xfrm>
           <a:prstGeom prst="rect">
             <a:avLst/>
           </a:prstGeom>
-          <a:solidFill>
-            <a:schemeClr val="bg1"/>
-          </a:solidFill>
         </p:spPr>
+        <p:style>
+          <a:lnRef idx="2">
+            <a:schemeClr val="accent5">
+              <a:shade val="50000"/>
+            </a:schemeClr>
+          </a:lnRef>
+          <a:fillRef idx="1">
+            <a:schemeClr val="accent5"/>
+          </a:fillRef>
+          <a:effectRef idx="0">
+            <a:schemeClr val="accent5"/>
+          </a:effectRef>
+          <a:fontRef idx="minor">
+            <a:schemeClr val="lt1"/>
+          </a:fontRef>
+        </p:style>
         <p:txBody>
-          <a:bodyPr wrap="square" rtlCol="0">
-            <a:spAutoFit/>
-          </a:bodyPr>
+          <a:bodyPr rtlCol="0" anchor="ctr"/>
           <a:lstStyle/>
           <a:p>
             <a:pPr algn="ctr"/>
             <a:r>
-              <a:rPr lang="en-GB" b="1" dirty="0" smtClean="0">
-                <a:solidFill>
-                  <a:srgbClr val="FF0000"/>
-                </a:solidFill>
-              </a:rPr>
-              <a:t>s2s</a:t>
-            </a:r>
-            <a:endParaRPr lang="en-US" b="1" dirty="0">
-              <a:solidFill>
-                <a:srgbClr val="FF0000"/>
-              </a:solidFill>
-            </a:endParaRPr>
+              <a:rPr lang="en-US" b="1" dirty="0" smtClean="0"/>
+              <a:t>IOCP</a:t>
+            </a:r>
+            <a:endParaRPr lang="en-US" b="1" dirty="0"/>
           </a:p>
         </p:txBody>
       </p:sp>
@@ -24104,11 +24349,11 @@
   <p:clrMapOvr>
     <a:masterClrMapping/>
   </p:clrMapOvr>
-  <mc:AlternateContent xmlns:mc="http://schemas.openxmlformats.org/markup-compatibility/2006" xmlns:p14="http://schemas.microsoft.com/office/powerpoint/2010/main">
-    <mc:Choice Requires="p14">
-      <p:transition p14:dur="0"/>
+  <mc:AlternateContent xmlns:mc="http://schemas.openxmlformats.org/markup-compatibility/2006">
+    <mc:Choice xmlns:p14="http://schemas.microsoft.com/office/powerpoint/2010/main" Requires="p14">
+      <p:transition p14:dur="10"/>
     </mc:Choice>
-    <mc:Fallback xmlns="">
+    <mc:Fallback>
       <p:transition/>
     </mc:Fallback>
   </mc:AlternateContent>
@@ -24270,6 +24515,13 @@
       <p:transition/>
     </mc:Fallback>
   </mc:AlternateContent>
+  <p:timing>
+    <p:tnLst>
+      <p:par>
+        <p:cTn id="1" dur="indefinite" restart="never" nodeType="tmRoot"/>
+      </p:par>
+    </p:tnLst>
+  </p:timing>
 </p:sld>
 </file>
 
@@ -24342,7 +24594,7 @@
         <p:spPr/>
         <p:txBody>
           <a:bodyPr>
-            <a:normAutofit/>
+            <a:normAutofit lnSpcReduction="10000"/>
           </a:bodyPr>
           <a:lstStyle/>
           <a:p>
@@ -24591,6 +24843,45 @@
             <a:r>
               <a:rPr lang="en-US" dirty="0" smtClean="0"/>
               <a:t>.</a:t>
+            </a:r>
+          </a:p>
+          <a:p>
+            <a:pPr lvl="1"/>
+            <a:r>
+              <a:rPr lang="en-US" dirty="0" smtClean="0"/>
+              <a:t>HTTP Keep-alive </a:t>
+            </a:r>
+            <a:r>
+              <a:rPr lang="en-US" dirty="0" err="1" smtClean="0"/>
+              <a:t>memungkinkan</a:t>
+            </a:r>
+            <a:r>
+              <a:rPr lang="en-US" dirty="0" smtClean="0"/>
+              <a:t> protocol http </a:t>
+            </a:r>
+            <a:r>
+              <a:rPr lang="en-US" dirty="0" err="1" smtClean="0"/>
+              <a:t>tetap</a:t>
+            </a:r>
+            <a:r>
+              <a:rPr lang="en-US" dirty="0" smtClean="0"/>
+              <a:t> </a:t>
+            </a:r>
+            <a:r>
+              <a:rPr lang="en-US" dirty="0" err="1" smtClean="0"/>
+              <a:t>digunakan</a:t>
+            </a:r>
+            <a:r>
+              <a:rPr lang="en-US" dirty="0" smtClean="0"/>
+              <a:t> </a:t>
+            </a:r>
+            <a:r>
+              <a:rPr lang="en-US" dirty="0" err="1" smtClean="0"/>
+              <a:t>pada</a:t>
+            </a:r>
+            <a:r>
+              <a:rPr lang="en-US" dirty="0" smtClean="0"/>
+              <a:t> existing connection.</a:t>
             </a:r>
             <a:endParaRPr lang="en-US" dirty="0"/>
           </a:p>

</xml_diff>